<commit_message>
added knowledge checks to slides
</commit_message>
<xml_diff>
--- a/help session/week2/week2_gold.pptx
+++ b/help session/week2/week2_gold.pptx
@@ -5,10 +5,10 @@
     <p:sldMasterId id="2147483648" r:id="rId1"/>
   </p:sldMasterIdLst>
   <p:notesMasterIdLst>
-    <p:notesMasterId r:id="rId8"/>
+    <p:notesMasterId r:id="rId10"/>
   </p:notesMasterIdLst>
   <p:handoutMasterIdLst>
-    <p:handoutMasterId r:id="rId9"/>
+    <p:handoutMasterId r:id="rId11"/>
   </p:handoutMasterIdLst>
   <p:sldIdLst>
     <p:sldId id="256" r:id="rId2"/>
@@ -16,7 +16,9 @@
     <p:sldId id="261" r:id="rId4"/>
     <p:sldId id="258" r:id="rId5"/>
     <p:sldId id="259" r:id="rId6"/>
-    <p:sldId id="260" r:id="rId7"/>
+    <p:sldId id="263" r:id="rId7"/>
+    <p:sldId id="262" r:id="rId8"/>
+    <p:sldId id="260" r:id="rId9"/>
   </p:sldIdLst>
   <p:sldSz cx="13817600" cy="7772400"/>
   <p:notesSz cx="6858000" cy="9144000"/>
@@ -219,7 +221,7 @@
           <a:p>
             <a:fld id="{4D7E51A5-B478-1E40-8CBB-0DAA8831E99D}" type="datetimeFigureOut">
               <a:rPr lang="en-US" smtClean="0"/>
-              <a:t>9/6/20</a:t>
+              <a:t>1/25/21</a:t>
             </a:fld>
             <a:endParaRPr lang="en-US"/>
           </a:p>
@@ -384,7 +386,7 @@
           <a:p>
             <a:fld id="{D0ED587F-861E-6740-9643-E3DDAE89B8D6}" type="datetimeFigureOut">
               <a:rPr lang="en-US" smtClean="0"/>
-              <a:t>9/6/20</a:t>
+              <a:t>1/25/21</a:t>
             </a:fld>
             <a:endParaRPr lang="en-US"/>
           </a:p>
@@ -726,6 +728,192 @@
     <p:extLst>
       <p:ext uri="{BB962C8B-B14F-4D97-AF65-F5344CB8AC3E}">
         <p14:creationId xmlns:p14="http://schemas.microsoft.com/office/powerpoint/2010/main" val="538101136"/>
+      </p:ext>
+    </p:extLst>
+  </p:cSld>
+  <p:clrMapOvr>
+    <a:masterClrMapping/>
+  </p:clrMapOvr>
+</p:notes>
+</file>
+
+<file path=ppt/notesSlides/notesSlide2.xml><?xml version="1.0" encoding="utf-8"?>
+<p:notes xmlns:a="http://schemas.openxmlformats.org/drawingml/2006/main" xmlns:r="http://schemas.openxmlformats.org/officeDocument/2006/relationships" xmlns:p="http://schemas.openxmlformats.org/presentationml/2006/main">
+  <p:cSld>
+    <p:spTree>
+      <p:nvGrpSpPr>
+        <p:cNvPr id="1" name=""/>
+        <p:cNvGrpSpPr/>
+        <p:nvPr/>
+      </p:nvGrpSpPr>
+      <p:grpSpPr>
+        <a:xfrm>
+          <a:off x="0" y="0"/>
+          <a:ext cx="0" cy="0"/>
+          <a:chOff x="0" y="0"/>
+          <a:chExt cx="0" cy="0"/>
+        </a:xfrm>
+      </p:grpSpPr>
+      <p:sp>
+        <p:nvSpPr>
+          <p:cNvPr id="2" name="Slide Image Placeholder 1"/>
+          <p:cNvSpPr>
+            <a:spLocks noGrp="1" noRot="1" noChangeAspect="1"/>
+          </p:cNvSpPr>
+          <p:nvPr>
+            <p:ph type="sldImg"/>
+          </p:nvPr>
+        </p:nvSpPr>
+        <p:spPr/>
+      </p:sp>
+      <p:sp>
+        <p:nvSpPr>
+          <p:cNvPr id="3" name="Notes Placeholder 2"/>
+          <p:cNvSpPr>
+            <a:spLocks noGrp="1"/>
+          </p:cNvSpPr>
+          <p:nvPr>
+            <p:ph type="body" idx="1"/>
+          </p:nvPr>
+        </p:nvSpPr>
+        <p:spPr/>
+        <p:txBody>
+          <a:bodyPr/>
+          <a:lstStyle/>
+          <a:p>
+            <a:r>
+              <a:rPr lang="en-US" dirty="0"/>
+              <a:t>TAs – remember, </a:t>
+            </a:r>
+            <a:r>
+              <a:rPr lang="en-US" dirty="0" err="1"/>
+              <a:t>System.in</a:t>
+            </a:r>
+            <a:r>
+              <a:rPr lang="en-US" dirty="0"/>
+              <a:t> triggers a new line as they are typing first! </a:t>
+            </a:r>
+          </a:p>
+          <a:p>
+            <a:endParaRPr lang="en-US" dirty="0"/>
+          </a:p>
+          <a:p>
+            <a:r>
+              <a:rPr lang="en-US" dirty="0"/>
+              <a:t>Line 1: </a:t>
+            </a:r>
+            <a:r>
+              <a:rPr lang="en-US" sz="1200" b="0" i="0" kern="1200" dirty="0">
+                <a:solidFill>
+                  <a:schemeClr val="tx1"/>
+                </a:solidFill>
+                <a:effectLst/>
+                <a:latin typeface="+mn-lt"/>
+                <a:ea typeface="+mn-ea"/>
+                <a:cs typeface="+mn-cs"/>
+              </a:rPr>
+              <a:t>Cerberus</a:t>
+            </a:r>
+          </a:p>
+          <a:p>
+            <a:r>
+              <a:rPr lang="en-US" sz="1200" b="0" i="0" kern="1200" dirty="0">
+                <a:solidFill>
+                  <a:schemeClr val="tx1"/>
+                </a:solidFill>
+                <a:effectLst/>
+                <a:latin typeface="+mn-lt"/>
+                <a:ea typeface="+mn-ea"/>
+                <a:cs typeface="+mn-cs"/>
+              </a:rPr>
+              <a:t>Line 2: 13</a:t>
+            </a:r>
+          </a:p>
+          <a:p>
+            <a:r>
+              <a:rPr lang="en-US" sz="1200" b="0" i="0" kern="1200" dirty="0">
+                <a:solidFill>
+                  <a:schemeClr val="tx1"/>
+                </a:solidFill>
+                <a:effectLst/>
+                <a:latin typeface="+mn-lt"/>
+                <a:ea typeface="+mn-ea"/>
+                <a:cs typeface="+mn-cs"/>
+              </a:rPr>
+              <a:t>Line 3: Cerberus has how many heads? 3.0heads</a:t>
+            </a:r>
+          </a:p>
+          <a:p>
+            <a:r>
+              <a:rPr lang="en-US" sz="1200" b="0" i="0" kern="1200" dirty="0">
+                <a:solidFill>
+                  <a:schemeClr val="tx1"/>
+                </a:solidFill>
+                <a:effectLst/>
+                <a:latin typeface="+mn-lt"/>
+                <a:ea typeface="+mn-ea"/>
+                <a:cs typeface="+mn-cs"/>
+              </a:rPr>
+              <a:t>Line 4: Cerberus is true</a:t>
+            </a:r>
+          </a:p>
+          <a:p>
+            <a:r>
+              <a:rPr lang="en-US" sz="1200" b="0" i="0" kern="1200" dirty="0">
+                <a:solidFill>
+                  <a:schemeClr val="tx1"/>
+                </a:solidFill>
+                <a:effectLst/>
+                <a:latin typeface="+mn-lt"/>
+                <a:ea typeface="+mn-ea"/>
+                <a:cs typeface="+mn-cs"/>
+              </a:rPr>
+              <a:t>Line 5: 3.0 </a:t>
+            </a:r>
+          </a:p>
+          <a:p>
+            <a:r>
+              <a:rPr lang="en-US" sz="1200" b="0" i="0" kern="1200" dirty="0">
+                <a:solidFill>
+                  <a:schemeClr val="tx1"/>
+                </a:solidFill>
+                <a:effectLst/>
+                <a:latin typeface="+mn-lt"/>
+                <a:ea typeface="+mn-ea"/>
+                <a:cs typeface="+mn-cs"/>
+              </a:rPr>
+              <a:t>(note the last one – feel free to run this one, if you get a lot of questions)</a:t>
+            </a:r>
+          </a:p>
+        </p:txBody>
+      </p:sp>
+      <p:sp>
+        <p:nvSpPr>
+          <p:cNvPr id="4" name="Slide Number Placeholder 3"/>
+          <p:cNvSpPr>
+            <a:spLocks noGrp="1"/>
+          </p:cNvSpPr>
+          <p:nvPr>
+            <p:ph type="sldNum" sz="quarter" idx="5"/>
+          </p:nvPr>
+        </p:nvSpPr>
+        <p:spPr/>
+        <p:txBody>
+          <a:bodyPr/>
+          <a:lstStyle/>
+          <a:p>
+            <a:fld id="{1A032F50-0B60-B34B-8422-4E195A5AE2C1}" type="slidenum">
+              <a:rPr lang="en-US" smtClean="0"/>
+              <a:t>7</a:t>
+            </a:fld>
+            <a:endParaRPr lang="en-US"/>
+          </a:p>
+        </p:txBody>
+      </p:sp>
+    </p:spTree>
+    <p:extLst>
+      <p:ext uri="{BB962C8B-B14F-4D97-AF65-F5344CB8AC3E}">
+        <p14:creationId xmlns:p14="http://schemas.microsoft.com/office/powerpoint/2010/main" val="881851184"/>
       </p:ext>
     </p:extLst>
   </p:cSld>
@@ -7697,6 +7885,236 @@
           <p:cNvPr id="2" name="Title 1">
             <a:extLst>
               <a:ext uri="{FF2B5EF4-FFF2-40B4-BE49-F238E27FC236}">
+                <a16:creationId xmlns:a16="http://schemas.microsoft.com/office/drawing/2014/main" id="{5526F23D-CB32-384B-9B39-164A42026395}"/>
+              </a:ext>
+            </a:extLst>
+          </p:cNvPr>
+          <p:cNvSpPr>
+            <a:spLocks noGrp="1"/>
+          </p:cNvSpPr>
+          <p:nvPr>
+            <p:ph type="title"/>
+          </p:nvPr>
+        </p:nvSpPr>
+        <p:spPr/>
+        <p:txBody>
+          <a:bodyPr/>
+          <a:lstStyle/>
+          <a:p>
+            <a:r>
+              <a:rPr lang="en-US" dirty="0"/>
+              <a:t>Knowledge Check: Working Together</a:t>
+            </a:r>
+          </a:p>
+        </p:txBody>
+      </p:sp>
+      <p:pic>
+        <p:nvPicPr>
+          <p:cNvPr id="4" name="Picture 3">
+            <a:extLst>
+              <a:ext uri="{FF2B5EF4-FFF2-40B4-BE49-F238E27FC236}">
+                <a16:creationId xmlns:a16="http://schemas.microsoft.com/office/drawing/2014/main" id="{ABBC87D2-E7B4-6240-9287-5722EC9D02C9}"/>
+              </a:ext>
+            </a:extLst>
+          </p:cNvPr>
+          <p:cNvPicPr>
+            <a:picLocks noChangeAspect="1"/>
+          </p:cNvPicPr>
+          <p:nvPr/>
+        </p:nvPicPr>
+        <p:blipFill>
+          <a:blip r:embed="rId2"/>
+          <a:stretch>
+            <a:fillRect/>
+          </a:stretch>
+        </p:blipFill>
+        <p:spPr>
+          <a:xfrm>
+            <a:off x="799523" y="1610616"/>
+            <a:ext cx="6109277" cy="5262970"/>
+          </a:xfrm>
+          <a:prstGeom prst="rect">
+            <a:avLst/>
+          </a:prstGeom>
+        </p:spPr>
+      </p:pic>
+      <p:pic>
+        <p:nvPicPr>
+          <p:cNvPr id="5" name="Picture 4">
+            <a:extLst>
+              <a:ext uri="{FF2B5EF4-FFF2-40B4-BE49-F238E27FC236}">
+                <a16:creationId xmlns:a16="http://schemas.microsoft.com/office/drawing/2014/main" id="{0C2639EA-FB47-3741-B9EE-C3CE09C670BB}"/>
+              </a:ext>
+            </a:extLst>
+          </p:cNvPr>
+          <p:cNvPicPr>
+            <a:picLocks noChangeAspect="1"/>
+          </p:cNvPicPr>
+          <p:nvPr/>
+        </p:nvPicPr>
+        <p:blipFill>
+          <a:blip r:embed="rId3"/>
+          <a:stretch>
+            <a:fillRect/>
+          </a:stretch>
+        </p:blipFill>
+        <p:spPr>
+          <a:xfrm>
+            <a:off x="7153731" y="2514901"/>
+            <a:ext cx="6035797" cy="2334190"/>
+          </a:xfrm>
+          <a:prstGeom prst="rect">
+            <a:avLst/>
+          </a:prstGeom>
+        </p:spPr>
+      </p:pic>
+    </p:spTree>
+    <p:extLst>
+      <p:ext uri="{BB962C8B-B14F-4D97-AF65-F5344CB8AC3E}">
+        <p14:creationId xmlns:p14="http://schemas.microsoft.com/office/powerpoint/2010/main" val="2981663469"/>
+      </p:ext>
+    </p:extLst>
+  </p:cSld>
+  <p:clrMapOvr>
+    <a:masterClrMapping/>
+  </p:clrMapOvr>
+  <mc:AlternateContent xmlns:mc="http://schemas.openxmlformats.org/markup-compatibility/2006" xmlns:p14="http://schemas.microsoft.com/office/powerpoint/2010/main">
+    <mc:Choice Requires="p14">
+      <p:transition p14:dur="300">
+        <p:fade/>
+      </p:transition>
+    </mc:Choice>
+    <mc:Fallback xmlns="">
+      <p:transition>
+        <p:fade/>
+      </p:transition>
+    </mc:Fallback>
+  </mc:AlternateContent>
+</p:sld>
+</file>
+
+<file path=ppt/slides/slide7.xml><?xml version="1.0" encoding="utf-8"?>
+<p:sld xmlns:a="http://schemas.openxmlformats.org/drawingml/2006/main" xmlns:r="http://schemas.openxmlformats.org/officeDocument/2006/relationships" xmlns:p="http://schemas.openxmlformats.org/presentationml/2006/main">
+  <p:cSld>
+    <p:spTree>
+      <p:nvGrpSpPr>
+        <p:cNvPr id="1" name=""/>
+        <p:cNvGrpSpPr/>
+        <p:nvPr/>
+      </p:nvGrpSpPr>
+      <p:grpSpPr>
+        <a:xfrm>
+          <a:off x="0" y="0"/>
+          <a:ext cx="0" cy="0"/>
+          <a:chOff x="0" y="0"/>
+          <a:chExt cx="0" cy="0"/>
+        </a:xfrm>
+      </p:grpSpPr>
+      <p:sp>
+        <p:nvSpPr>
+          <p:cNvPr id="2" name="Title 1">
+            <a:extLst>
+              <a:ext uri="{FF2B5EF4-FFF2-40B4-BE49-F238E27FC236}">
+                <a16:creationId xmlns:a16="http://schemas.microsoft.com/office/drawing/2014/main" id="{7E24464D-1D94-B84B-8595-5A3AE89868E1}"/>
+              </a:ext>
+            </a:extLst>
+          </p:cNvPr>
+          <p:cNvSpPr>
+            <a:spLocks noGrp="1"/>
+          </p:cNvSpPr>
+          <p:nvPr>
+            <p:ph type="title"/>
+          </p:nvPr>
+        </p:nvSpPr>
+        <p:spPr/>
+        <p:txBody>
+          <a:bodyPr/>
+          <a:lstStyle/>
+          <a:p>
+            <a:r>
+              <a:rPr lang="en-US" dirty="0"/>
+              <a:t>Knowledge Check: Working Together</a:t>
+            </a:r>
+          </a:p>
+        </p:txBody>
+      </p:sp>
+      <p:pic>
+        <p:nvPicPr>
+          <p:cNvPr id="4" name="Picture 3">
+            <a:extLst>
+              <a:ext uri="{FF2B5EF4-FFF2-40B4-BE49-F238E27FC236}">
+                <a16:creationId xmlns:a16="http://schemas.microsoft.com/office/drawing/2014/main" id="{89A62C7D-BC6B-F84E-9D93-294856C53F91}"/>
+              </a:ext>
+            </a:extLst>
+          </p:cNvPr>
+          <p:cNvPicPr>
+            <a:picLocks noChangeAspect="1"/>
+          </p:cNvPicPr>
+          <p:nvPr/>
+        </p:nvPicPr>
+        <p:blipFill>
+          <a:blip r:embed="rId3"/>
+          <a:stretch>
+            <a:fillRect/>
+          </a:stretch>
+        </p:blipFill>
+        <p:spPr>
+          <a:xfrm>
+            <a:off x="2923308" y="1463722"/>
+            <a:ext cx="7430077" cy="6046989"/>
+          </a:xfrm>
+          <a:prstGeom prst="rect">
+            <a:avLst/>
+          </a:prstGeom>
+        </p:spPr>
+      </p:pic>
+    </p:spTree>
+    <p:extLst>
+      <p:ext uri="{BB962C8B-B14F-4D97-AF65-F5344CB8AC3E}">
+        <p14:creationId xmlns:p14="http://schemas.microsoft.com/office/powerpoint/2010/main" val="587830584"/>
+      </p:ext>
+    </p:extLst>
+  </p:cSld>
+  <p:clrMapOvr>
+    <a:masterClrMapping/>
+  </p:clrMapOvr>
+  <mc:AlternateContent xmlns:mc="http://schemas.openxmlformats.org/markup-compatibility/2006" xmlns:p14="http://schemas.microsoft.com/office/powerpoint/2010/main">
+    <mc:Choice Requires="p14">
+      <p:transition p14:dur="300">
+        <p:fade/>
+      </p:transition>
+    </mc:Choice>
+    <mc:Fallback xmlns="">
+      <p:transition>
+        <p:fade/>
+      </p:transition>
+    </mc:Fallback>
+  </mc:AlternateContent>
+</p:sld>
+</file>
+
+<file path=ppt/slides/slide8.xml><?xml version="1.0" encoding="utf-8"?>
+<p:sld xmlns:a="http://schemas.openxmlformats.org/drawingml/2006/main" xmlns:r="http://schemas.openxmlformats.org/officeDocument/2006/relationships" xmlns:p="http://schemas.openxmlformats.org/presentationml/2006/main">
+  <p:cSld>
+    <p:spTree>
+      <p:nvGrpSpPr>
+        <p:cNvPr id="1" name=""/>
+        <p:cNvGrpSpPr/>
+        <p:nvPr/>
+      </p:nvGrpSpPr>
+      <p:grpSpPr>
+        <a:xfrm>
+          <a:off x="0" y="0"/>
+          <a:ext cx="0" cy="0"/>
+          <a:chOff x="0" y="0"/>
+          <a:chExt cx="0" cy="0"/>
+        </a:xfrm>
+      </p:grpSpPr>
+      <p:sp>
+        <p:nvSpPr>
+          <p:cNvPr id="2" name="Title 1">
+            <a:extLst>
+              <a:ext uri="{FF2B5EF4-FFF2-40B4-BE49-F238E27FC236}">
                 <a16:creationId xmlns:a16="http://schemas.microsoft.com/office/drawing/2014/main" id="{D15E6172-ECFD-1646-A49B-65043E158296}"/>
               </a:ext>
             </a:extLst>
@@ -7942,6 +8360,49 @@
             <a:r>
               <a:rPr lang="en-US" dirty="0"/>
               <a:t>Let’s look at some examples</a:t>
+            </a:r>
+          </a:p>
+        </p:txBody>
+      </p:sp>
+      <p:sp>
+        <p:nvSpPr>
+          <p:cNvPr id="5" name="TextBox 4">
+            <a:extLst>
+              <a:ext uri="{FF2B5EF4-FFF2-40B4-BE49-F238E27FC236}">
+                <a16:creationId xmlns:a16="http://schemas.microsoft.com/office/drawing/2014/main" id="{E61B983B-1A06-8B42-A43E-BAF5EBF7282B}"/>
+              </a:ext>
+            </a:extLst>
+          </p:cNvPr>
+          <p:cNvSpPr txBox="1"/>
+          <p:nvPr/>
+        </p:nvSpPr>
+        <p:spPr>
+          <a:xfrm>
+            <a:off x="8103626" y="1009752"/>
+            <a:ext cx="4602542" cy="400110"/>
+          </a:xfrm>
+          <a:prstGeom prst="rect">
+            <a:avLst/>
+          </a:prstGeom>
+          <a:noFill/>
+        </p:spPr>
+        <p:txBody>
+          <a:bodyPr wrap="none" rtlCol="0">
+            <a:spAutoFit/>
+          </a:bodyPr>
+          <a:lstStyle/>
+          <a:p>
+            <a:r>
+              <a:rPr lang="en-US" dirty="0"/>
+              <a:t>Code in </a:t>
+            </a:r>
+            <a:r>
+              <a:rPr lang="en-US" dirty="0" err="1"/>
+              <a:t>zybooks</a:t>
+            </a:r>
+            <a:r>
+              <a:rPr lang="en-US" dirty="0"/>
+              <a:t> – to follow along with!</a:t>
             </a:r>
           </a:p>
         </p:txBody>

</xml_diff>

<commit_message>
added a TA note
</commit_message>
<xml_diff>
--- a/help session/week2/week2_gold.pptx
+++ b/help session/week2/week2_gold.pptx
@@ -1330,7 +1330,31 @@
                 <a:ea typeface="+mn-ea"/>
                 <a:cs typeface="+mn-cs"/>
               </a:rPr>
-              <a:t>(note the last one – feel free to run this one, if you get a lot of questions)</a:t>
+              <a:t>(note the last one – feel free to run this one in </a:t>
+            </a:r>
+            <a:r>
+              <a:rPr lang="en-US" sz="1200" b="0" i="0" kern="1200">
+                <a:solidFill>
+                  <a:schemeClr val="tx1"/>
+                </a:solidFill>
+                <a:effectLst/>
+                <a:latin typeface="+mn-lt"/>
+                <a:ea typeface="+mn-ea"/>
+                <a:cs typeface="+mn-cs"/>
+              </a:rPr>
+              <a:t>a  *terminal*, </a:t>
+            </a:r>
+            <a:r>
+              <a:rPr lang="en-US" sz="1200" b="0" i="0" kern="1200" dirty="0">
+                <a:solidFill>
+                  <a:schemeClr val="tx1"/>
+                </a:solidFill>
+                <a:effectLst/>
+                <a:latin typeface="+mn-lt"/>
+                <a:ea typeface="+mn-ea"/>
+                <a:cs typeface="+mn-cs"/>
+              </a:rPr>
+              <a:t>if you get a lot of questions)</a:t>
             </a:r>
           </a:p>
         </p:txBody>

</xml_diff>